<commit_message>
fix: session06 nest.js codes added
</commit_message>
<xml_diff>
--- a/nestjs/nestjs-06.pptx
+++ b/nestjs/nestjs-06.pptx
@@ -217,7 +217,7 @@
           <a:p>
             <a:fld id="{9B9ECB28-6A22-4037-9487-F3F739F744D6}" type="datetimeFigureOut">
               <a:rPr lang="en-US" smtClean="0"/>
-              <a:t>1/28/2022</a:t>
+              <a:t>1/29/2022</a:t>
             </a:fld>
             <a:endParaRPr lang="en-US"/>
           </a:p>
@@ -530,6 +530,96 @@
           <a:p>
             <a:r>
               <a:rPr lang="en-US" dirty="0"/>
+              <a:t>For interceptors, take a look at the https://en.wikipedia.org/wiki/Aspect-oriented_programming</a:t>
+            </a:r>
+          </a:p>
+          <a:p>
+            <a:endParaRPr lang="en-US" dirty="0"/>
+          </a:p>
+        </p:txBody>
+      </p:sp>
+      <p:sp>
+        <p:nvSpPr>
+          <p:cNvPr id="4" name="Slide Number Placeholder 3"/>
+          <p:cNvSpPr>
+            <a:spLocks noGrp="1"/>
+          </p:cNvSpPr>
+          <p:nvPr>
+            <p:ph type="sldNum" sz="quarter" idx="5"/>
+          </p:nvPr>
+        </p:nvSpPr>
+        <p:spPr/>
+        <p:txBody>
+          <a:bodyPr/>
+          <a:lstStyle/>
+          <a:p>
+            <a:fld id="{0FE84E6F-3671-472C-BE6F-A37BC298F4AB}" type="slidenum">
+              <a:rPr lang="en-US" smtClean="0"/>
+              <a:t>4</a:t>
+            </a:fld>
+            <a:endParaRPr lang="en-US"/>
+          </a:p>
+        </p:txBody>
+      </p:sp>
+    </p:spTree>
+    <p:extLst>
+      <p:ext uri="{BB962C8B-B14F-4D97-AF65-F5344CB8AC3E}">
+        <p14:creationId xmlns:p14="http://schemas.microsoft.com/office/powerpoint/2010/main" val="4185216621"/>
+      </p:ext>
+    </p:extLst>
+  </p:cSld>
+  <p:clrMapOvr>
+    <a:masterClrMapping/>
+  </p:clrMapOvr>
+</p:notes>
+</file>
+
+<file path=ppt/notesSlides/notesSlide2.xml><?xml version="1.0" encoding="utf-8"?>
+<p:notes xmlns:a="http://schemas.openxmlformats.org/drawingml/2006/main" xmlns:r="http://schemas.openxmlformats.org/officeDocument/2006/relationships" xmlns:p="http://schemas.openxmlformats.org/presentationml/2006/main">
+  <p:cSld>
+    <p:spTree>
+      <p:nvGrpSpPr>
+        <p:cNvPr id="1" name=""/>
+        <p:cNvGrpSpPr/>
+        <p:nvPr/>
+      </p:nvGrpSpPr>
+      <p:grpSpPr>
+        <a:xfrm>
+          <a:off x="0" y="0"/>
+          <a:ext cx="0" cy="0"/>
+          <a:chOff x="0" y="0"/>
+          <a:chExt cx="0" cy="0"/>
+        </a:xfrm>
+      </p:grpSpPr>
+      <p:sp>
+        <p:nvSpPr>
+          <p:cNvPr id="2" name="Slide Image Placeholder 1"/>
+          <p:cNvSpPr>
+            <a:spLocks noGrp="1" noRot="1" noChangeAspect="1"/>
+          </p:cNvSpPr>
+          <p:nvPr>
+            <p:ph type="sldImg"/>
+          </p:nvPr>
+        </p:nvSpPr>
+        <p:spPr/>
+      </p:sp>
+      <p:sp>
+        <p:nvSpPr>
+          <p:cNvPr id="3" name="Notes Placeholder 2"/>
+          <p:cNvSpPr>
+            <a:spLocks noGrp="1"/>
+          </p:cNvSpPr>
+          <p:nvPr>
+            <p:ph type="body" idx="1"/>
+          </p:nvPr>
+        </p:nvSpPr>
+        <p:spPr/>
+        <p:txBody>
+          <a:bodyPr/>
+          <a:lstStyle/>
+          <a:p>
+            <a:r>
+              <a:rPr lang="en-US" dirty="0"/>
               <a:t>Hint: </a:t>
             </a:r>
             <a:r>
@@ -811,7 +901,7 @@
           <a:p>
             <a:fld id="{19B6F524-99F3-4BEA-ACD7-976EF4D36657}" type="datetime1">
               <a:rPr lang="en-US" smtClean="0"/>
-              <a:t>1/28/2022</a:t>
+              <a:t>1/29/2022</a:t>
             </a:fld>
             <a:endParaRPr lang="en-US" dirty="0"/>
           </a:p>
@@ -1120,7 +1210,7 @@
           <a:p>
             <a:fld id="{2145C3A9-05D9-428D-9788-A7F14838F6F9}" type="datetime1">
               <a:rPr lang="en-US" smtClean="0"/>
-              <a:t>1/28/2022</a:t>
+              <a:t>1/29/2022</a:t>
             </a:fld>
             <a:endParaRPr lang="en-US" dirty="0"/>
           </a:p>
@@ -1318,7 +1408,7 @@
           <a:p>
             <a:fld id="{82C701FB-B03E-4981-A9F8-99B474DD173A}" type="datetime1">
               <a:rPr lang="en-US" smtClean="0"/>
-              <a:t>1/28/2022</a:t>
+              <a:t>1/29/2022</a:t>
             </a:fld>
             <a:endParaRPr lang="en-US" dirty="0"/>
           </a:p>
@@ -1585,7 +1675,7 @@
           <a:p>
             <a:fld id="{7A7E8EF3-CBF7-4EB9-B6E5-3754574E3433}" type="datetime1">
               <a:rPr lang="en-US" smtClean="0"/>
-              <a:t>1/28/2022</a:t>
+              <a:t>1/29/2022</a:t>
             </a:fld>
             <a:endParaRPr lang="en-US" dirty="0"/>
           </a:p>
@@ -2025,7 +2115,7 @@
           <a:p>
             <a:fld id="{DA8A4A96-31AC-487C-9F15-1822D58542B7}" type="datetime1">
               <a:rPr lang="en-US" smtClean="0"/>
-              <a:t>1/28/2022</a:t>
+              <a:t>1/29/2022</a:t>
             </a:fld>
             <a:endParaRPr lang="en-US" dirty="0"/>
           </a:p>
@@ -2566,7 +2656,7 @@
           <a:p>
             <a:fld id="{FBBF9546-09C4-4F24-A284-5B81FF8659B4}" type="datetime1">
               <a:rPr lang="en-US" smtClean="0"/>
-              <a:t>1/28/2022</a:t>
+              <a:t>1/29/2022</a:t>
             </a:fld>
             <a:endParaRPr lang="en-US" dirty="0"/>
           </a:p>
@@ -3452,7 +3542,7 @@
           <a:p>
             <a:fld id="{5BF4405D-15A5-450B-B053-484859B9C8F7}" type="datetime1">
               <a:rPr lang="en-US" smtClean="0"/>
-              <a:t>1/28/2022</a:t>
+              <a:t>1/29/2022</a:t>
             </a:fld>
             <a:endParaRPr lang="en-US" dirty="0"/>
           </a:p>
@@ -3626,7 +3716,7 @@
           <a:p>
             <a:fld id="{E0366559-EC21-40C1-8A65-9A3B4EA78391}" type="datetime1">
               <a:rPr lang="en-US" smtClean="0"/>
-              <a:t>1/28/2022</a:t>
+              <a:t>1/29/2022</a:t>
             </a:fld>
             <a:endParaRPr lang="en-US" dirty="0"/>
           </a:p>
@@ -3814,7 +3904,7 @@
           <a:p>
             <a:fld id="{4F09CA92-695C-4FFA-8E37-4D2C288BCC04}" type="datetime1">
               <a:rPr lang="en-US" smtClean="0"/>
-              <a:t>1/28/2022</a:t>
+              <a:t>1/29/2022</a:t>
             </a:fld>
             <a:endParaRPr lang="en-US" dirty="0"/>
           </a:p>
@@ -3988,7 +4078,7 @@
           <a:p>
             <a:fld id="{CA551262-FC07-4FE4-9221-F72F7D4F209A}" type="datetime1">
               <a:rPr lang="en-US" smtClean="0"/>
-              <a:t>1/28/2022</a:t>
+              <a:t>1/29/2022</a:t>
             </a:fld>
             <a:endParaRPr lang="en-US" dirty="0"/>
           </a:p>
@@ -4236,7 +4326,7 @@
           <a:p>
             <a:fld id="{46A321E4-8899-4F7D-BEB1-BD52626ABD8D}" type="datetime1">
               <a:rPr lang="en-US" smtClean="0"/>
-              <a:t>1/28/2022</a:t>
+              <a:t>1/29/2022</a:t>
             </a:fld>
             <a:endParaRPr lang="en-US" dirty="0"/>
           </a:p>
@@ -4482,7 +4572,7 @@
           <a:p>
             <a:fld id="{B53F6DFA-8A0E-4513-867D-18B9AA66B23C}" type="datetime1">
               <a:rPr lang="en-US" smtClean="0"/>
-              <a:t>1/28/2022</a:t>
+              <a:t>1/29/2022</a:t>
             </a:fld>
             <a:endParaRPr lang="en-US" dirty="0"/>
           </a:p>
@@ -4969,7 +5059,7 @@
           <a:p>
             <a:fld id="{154283A7-B9AC-454B-A468-44B75A398B49}" type="datetime1">
               <a:rPr lang="en-US" smtClean="0"/>
-              <a:t>1/28/2022</a:t>
+              <a:t>1/29/2022</a:t>
             </a:fld>
             <a:endParaRPr lang="en-US" dirty="0"/>
           </a:p>
@@ -5091,7 +5181,7 @@
           <a:p>
             <a:fld id="{A3F8184D-DEDD-48A0-9ACA-5F6ED9EFE5B8}" type="datetime1">
               <a:rPr lang="en-US" smtClean="0"/>
-              <a:t>1/28/2022</a:t>
+              <a:t>1/29/2022</a:t>
             </a:fld>
             <a:endParaRPr lang="en-US" dirty="0"/>
           </a:p>
@@ -5190,7 +5280,7 @@
           <a:p>
             <a:fld id="{BF38AC0E-F520-48F3-BA14-8BAB82D735FB}" type="datetime1">
               <a:rPr lang="en-US" smtClean="0"/>
-              <a:t>1/28/2022</a:t>
+              <a:t>1/29/2022</a:t>
             </a:fld>
             <a:endParaRPr lang="en-US" dirty="0"/>
           </a:p>
@@ -5449,7 +5539,7 @@
           <a:p>
             <a:fld id="{317D0F2A-2724-4AD4-BF4C-A7B1910D9412}" type="datetime1">
               <a:rPr lang="en-US" smtClean="0"/>
-              <a:t>1/28/2022</a:t>
+              <a:t>1/29/2022</a:t>
             </a:fld>
             <a:endParaRPr lang="en-US" dirty="0"/>
           </a:p>
@@ -5760,7 +5850,7 @@
           <a:p>
             <a:fld id="{9A0B82A5-4A21-4F82-91DB-989CE997E82E}" type="datetime1">
               <a:rPr lang="en-US" smtClean="0"/>
-              <a:t>1/28/2022</a:t>
+              <a:t>1/29/2022</a:t>
             </a:fld>
             <a:endParaRPr lang="en-US" dirty="0"/>
           </a:p>
@@ -5997,7 +6087,7 @@
           <a:p>
             <a:fld id="{01BFEF8A-AE08-4951-B923-589F814B0C31}" type="datetime1">
               <a:rPr lang="en-US" smtClean="0"/>
-              <a:t>1/28/2022</a:t>
+              <a:t>1/29/2022</a:t>
             </a:fld>
             <a:endParaRPr lang="en-US" dirty="0"/>
           </a:p>
@@ -6815,7 +6905,7 @@
           <a:p>
             <a:r>
               <a:rPr lang="en-US" sz="2800" dirty="0"/>
-              <a:t>05 – Configuration</a:t>
+              <a:t>06 – Other building blocks</a:t>
             </a:r>
           </a:p>
         </p:txBody>
@@ -6931,15 +7021,23 @@
           <a:p>
             <a:pPr lvl="1"/>
             <a:r>
-              <a:rPr lang="en-US" dirty="0"/>
+              <a:rPr lang="en-US" dirty="0">
+                <a:latin typeface="Consolas" panose="020B0609020204030204" pitchFamily="49" charset="0"/>
+              </a:rPr>
               <a:t>nest g filter &lt;path-to-your-class&gt;</a:t>
             </a:r>
           </a:p>
           <a:p>
             <a:pPr lvl="1"/>
             <a:r>
-              <a:rPr lang="en-US" dirty="0"/>
-              <a:t>@Catch decorator binds required metadata to the exception filter</a:t>
+              <a:rPr lang="en-US" dirty="0">
+                <a:latin typeface="Consolas" panose="020B0609020204030204" pitchFamily="49" charset="0"/>
+              </a:rPr>
+              <a:t>@Catch </a:t>
+            </a:r>
+            <a:r>
+              <a:rPr lang="en-US" dirty="0"/>
+              <a:t>decorator binds required metadata to the exception filter</a:t>
             </a:r>
           </a:p>
           <a:p>
@@ -7111,27 +7209,35 @@
             </a:r>
           </a:p>
           <a:p>
+            <a:pPr lvl="2"/>
+            <a:r>
+              <a:rPr lang="en-US" dirty="0" err="1">
+                <a:latin typeface="Consolas" panose="020B0609020204030204" pitchFamily="49" charset="0"/>
+              </a:rPr>
+              <a:t>host.switchToHttp</a:t>
+            </a:r>
+            <a:r>
+              <a:rPr lang="en-US" dirty="0">
+                <a:latin typeface="Consolas" panose="020B0609020204030204" pitchFamily="49" charset="0"/>
+              </a:rPr>
+              <a:t>()</a:t>
+            </a:r>
+          </a:p>
+          <a:p>
             <a:pPr lvl="3"/>
             <a:r>
-              <a:rPr lang="en-US" dirty="0" err="1"/>
-              <a:t>host.switchToHttp</a:t>
-            </a:r>
-            <a:r>
-              <a:rPr lang="en-US" dirty="0"/>
-              <a:t>()</a:t>
-            </a:r>
-          </a:p>
-          <a:p>
-            <a:pPr lvl="3"/>
-            <a:r>
               <a:rPr lang="en-US" dirty="0"/>
               <a:t>This will give us the context, and then </a:t>
             </a:r>
             <a:r>
-              <a:rPr lang="en-US" dirty="0" err="1"/>
+              <a:rPr lang="en-US" sz="2100" dirty="0" err="1">
+                <a:latin typeface="Consolas" panose="020B0609020204030204" pitchFamily="49" charset="0"/>
+              </a:rPr>
               <a:t>getResponse</a:t>
             </a:r>
-            <a:endParaRPr lang="en-US" dirty="0"/>
+            <a:endParaRPr lang="en-US" sz="2100" dirty="0">
+              <a:latin typeface="Consolas" panose="020B0609020204030204" pitchFamily="49" charset="0"/>
+            </a:endParaRPr>
           </a:p>
           <a:p>
             <a:pPr lvl="1"/>
@@ -7450,7 +7556,7 @@
         <p:spPr/>
         <p:txBody>
           <a:bodyPr>
-            <a:normAutofit lnSpcReduction="10000"/>
+            <a:normAutofit fontScale="92500"/>
           </a:bodyPr>
           <a:lstStyle/>
           <a:p>
@@ -7513,14 +7619,18 @@
           <a:p>
             <a:pPr lvl="2"/>
             <a:r>
-              <a:rPr lang="en-US" dirty="0"/>
+              <a:rPr lang="en-US" dirty="0">
+                <a:latin typeface="Consolas" panose="020B0609020204030204" pitchFamily="49" charset="0"/>
+              </a:rPr>
               <a:t>nest g guard &lt;path-to-your-class&gt;</a:t>
             </a:r>
           </a:p>
           <a:p>
             <a:pPr lvl="2"/>
             <a:r>
-              <a:rPr lang="en-US" dirty="0" err="1"/>
+              <a:rPr lang="en-US" sz="2100" dirty="0" err="1">
+                <a:latin typeface="Consolas" panose="020B0609020204030204" pitchFamily="49" charset="0"/>
+              </a:rPr>
               <a:t>canActivate</a:t>
             </a:r>
             <a:r>
@@ -7544,7 +7654,20 @@
               <a:rPr lang="en-US" dirty="0">
                 <a:sym typeface="Wingdings" panose="05000000000000000000" pitchFamily="2" charset="2"/>
               </a:rPr>
-              <a:t> 403 (forbidden resource)</a:t>
+              <a:t> </a:t>
+            </a:r>
+            <a:r>
+              <a:rPr lang="en-US" sz="2300" dirty="0">
+                <a:latin typeface="Consolas" panose="020B0609020204030204" pitchFamily="49" charset="0"/>
+                <a:sym typeface="Wingdings" panose="05000000000000000000" pitchFamily="2" charset="2"/>
+              </a:rPr>
+              <a:t>403</a:t>
+            </a:r>
+            <a:r>
+              <a:rPr lang="en-US" dirty="0">
+                <a:sym typeface="Wingdings" panose="05000000000000000000" pitchFamily="2" charset="2"/>
+              </a:rPr>
+              <a:t> (forbidden resource)</a:t>
             </a:r>
             <a:endParaRPr lang="en-US" dirty="0"/>
           </a:p>
@@ -7705,7 +7828,9 @@
           <a:p>
             <a:pPr lvl="1"/>
             <a:r>
-              <a:rPr lang="en-US" dirty="0"/>
+              <a:rPr lang="en-US" dirty="0">
+                <a:latin typeface="Consolas" panose="020B0609020204030204" pitchFamily="49" charset="0"/>
+              </a:rPr>
               <a:t>@SetMetadata(key, value)</a:t>
             </a:r>
           </a:p>
@@ -7755,7 +7880,17 @@
             <a:pPr lvl="1"/>
             <a:r>
               <a:rPr lang="en-US" dirty="0"/>
-              <a:t>Remember, if you use other dependency like reflector, then you have to use providers (APP_GUARD) to follow injection rules</a:t>
+              <a:t>Remember, if you use other dependency like reflector, then you have to use providers (APP_</a:t>
+            </a:r>
+            <a:r>
+              <a:rPr lang="en-US" dirty="0">
+                <a:latin typeface="Consolas" panose="020B0609020204030204" pitchFamily="49" charset="0"/>
+              </a:rPr>
+              <a:t>GUARD</a:t>
+            </a:r>
+            <a:r>
+              <a:rPr lang="en-US" dirty="0"/>
+              <a:t>) to follow injection rules</a:t>
             </a:r>
           </a:p>
           <a:p>
@@ -8103,7 +8238,9 @@
           <a:p>
             <a:pPr lvl="1"/>
             <a:r>
-              <a:rPr lang="en-US" dirty="0"/>
+              <a:rPr lang="en-US" dirty="0">
+                <a:latin typeface="Consolas" panose="020B0609020204030204" pitchFamily="49" charset="0"/>
+              </a:rPr>
               <a:t>nest g interceptor &lt;path-to-your-class&gt;</a:t>
             </a:r>
           </a:p>
@@ -8274,12 +8411,20 @@
               <a:t>After: You can pipe to the observable returned from the </a:t>
             </a:r>
             <a:r>
-              <a:rPr lang="en-US" dirty="0" err="1"/>
+              <a:rPr lang="en-US" dirty="0" err="1">
+                <a:latin typeface="Consolas" panose="020B0609020204030204" pitchFamily="49" charset="0"/>
+              </a:rPr>
               <a:t>nest.handle</a:t>
             </a:r>
             <a:r>
-              <a:rPr lang="en-US" dirty="0"/>
-              <a:t>() function</a:t>
+              <a:rPr lang="en-US" dirty="0">
+                <a:latin typeface="Consolas" panose="020B0609020204030204" pitchFamily="49" charset="0"/>
+              </a:rPr>
+              <a:t>() </a:t>
+            </a:r>
+            <a:r>
+              <a:rPr lang="en-US" dirty="0"/>
+              <a:t>function</a:t>
             </a:r>
           </a:p>
           <a:p>
@@ -8441,6 +8586,12 @@
         <p:txBody>
           <a:bodyPr/>
           <a:lstStyle/>
+          <a:p>
+            <a:r>
+              <a:rPr lang="en-US" dirty="0"/>
+              <a:t>Remove all commas from prices and then pass it to the service</a:t>
+            </a:r>
+          </a:p>
           <a:p>
             <a:endParaRPr lang="fa-IR" dirty="0"/>
           </a:p>
@@ -8781,7 +8932,7 @@
         <p:spPr/>
         <p:txBody>
           <a:bodyPr>
-            <a:normAutofit lnSpcReduction="10000"/>
+            <a:normAutofit/>
           </a:bodyPr>
           <a:lstStyle/>
           <a:p>
@@ -8852,26 +9003,6 @@
                 </a:solidFill>
               </a:rPr>
               <a:t>Creating Custom Pipes</a:t>
-            </a:r>
-          </a:p>
-          <a:p>
-            <a:r>
-              <a:rPr lang="en-US" dirty="0">
-                <a:solidFill>
-                  <a:schemeClr val="tx1"/>
-                </a:solidFill>
-              </a:rPr>
-              <a:t>Add Request Logging with Middlewares</a:t>
-            </a:r>
-          </a:p>
-          <a:p>
-            <a:r>
-              <a:rPr lang="en-US" dirty="0">
-                <a:solidFill>
-                  <a:schemeClr val="tx1"/>
-                </a:solidFill>
-              </a:rPr>
-              <a:t>Create Custom Param Decorators</a:t>
             </a:r>
           </a:p>
         </p:txBody>
@@ -9022,7 +9153,9 @@
           <a:p>
             <a:pPr lvl="1"/>
             <a:r>
-              <a:rPr lang="en-US" dirty="0"/>
+              <a:rPr lang="en-US" dirty="0">
+                <a:latin typeface="Consolas" panose="020B0609020204030204" pitchFamily="49" charset="0"/>
+              </a:rPr>
               <a:t>nest g pipe &lt;path-to-your-class&gt;</a:t>
             </a:r>
           </a:p>
@@ -9213,10 +9346,8 @@
             </a:r>
           </a:p>
           <a:p>
-            <a:r>
-              <a:rPr lang="en-US" dirty="0"/>
-              <a:t>Optional:</a:t>
-            </a:r>
+            <a:pPr lvl="1"/>
+            <a:endParaRPr lang="en-US" dirty="0"/>
           </a:p>
         </p:txBody>
       </p:sp>
@@ -10088,7 +10219,7 @@
         <p:spPr/>
         <p:txBody>
           <a:bodyPr>
-            <a:normAutofit lnSpcReduction="10000"/>
+            <a:normAutofit fontScale="92500" lnSpcReduction="20000"/>
           </a:bodyPr>
           <a:lstStyle/>
           <a:p>
@@ -10169,7 +10300,7 @@
             <a:pPr lvl="2"/>
             <a:r>
               <a:rPr lang="en-US" dirty="0"/>
-              <a:t>Using provider tokens (exported from nest core package) inside AppModule:</a:t>
+              <a:t>Using global provider tokens (exported from nest core package) inside AppModule:</a:t>
             </a:r>
           </a:p>
           <a:p>
@@ -10177,6 +10308,22 @@
             <a:r>
               <a:rPr lang="en-US" dirty="0"/>
               <a:t>APP_PIPE, APP_GUARD, APP_FILTER, APP_INTERCEPTOR</a:t>
+            </a:r>
+          </a:p>
+          <a:p>
+            <a:pPr lvl="2"/>
+            <a:r>
+              <a:rPr lang="en-US" dirty="0"/>
+              <a:t>It’s up to you where to provide them, but no matter, they are global for all modules</a:t>
+            </a:r>
+          </a:p>
+          <a:p>
+            <a:pPr lvl="3"/>
+            <a:r>
+              <a:rPr lang="en-US" dirty="0">
+                <a:hlinkClick r:id="rId2"/>
+              </a:rPr>
+              <a:t>https://docs.nestjs.com/pipes#global-scoped-pipes</a:t>
             </a:r>
             <a:endParaRPr lang="fa-IR" dirty="0"/>
           </a:p>

</xml_diff>